<commit_message>
KPU GameEngineering - 2D Game Programmingr - Term Project
</commit_message>
<xml_diff>
--- a/2DGameProgramming/2013182030_이상기_1차발표.pptx
+++ b/2DGameProgramming/2013182030_이상기_1차발표.pptx
@@ -17348,14 +17348,14 @@
           <p:nvPr>
             <p:extLst>
               <p:ext uri="{D42A27DB-BD31-4B8C-83A1-F6EECF244321}">
-                <p14:modId xmlns:p14="http://schemas.microsoft.com/office/powerpoint/2010/main" val="2118165121"/>
+                <p14:modId xmlns:p14="http://schemas.microsoft.com/office/powerpoint/2010/main" val="1361851345"/>
               </p:ext>
             </p:extLst>
           </p:nvPr>
         </p:nvGraphicFramePr>
         <p:xfrm>
-          <a:off x="0" y="296786"/>
-          <a:ext cx="11675649" cy="6084541"/>
+          <a:off x="-9951" y="348717"/>
+          <a:ext cx="11722576" cy="6032610"/>
         </p:xfrm>
         <a:graphic>
           <a:graphicData uri="http://schemas.openxmlformats.org/drawingml/2006/table">
@@ -17364,21 +17364,21 @@
                 <a:tableStyleId>{D7AC3CCA-C797-4891-BE02-D94E43425B78}</a:tableStyleId>
               </a:tblPr>
               <a:tblGrid>
-                <a:gridCol w="1386062">
+                <a:gridCol w="1391633">
                   <a:extLst>
                     <a:ext uri="{9D8B030D-6E8A-4147-A177-3AD203B41FA5}">
                       <a16:colId xmlns:a16="http://schemas.microsoft.com/office/drawing/2014/main" val="20000"/>
                     </a:ext>
                   </a:extLst>
                 </a:gridCol>
-                <a:gridCol w="2748976">
+                <a:gridCol w="2760025">
                   <a:extLst>
                     <a:ext uri="{9D8B030D-6E8A-4147-A177-3AD203B41FA5}">
                       <a16:colId xmlns:a16="http://schemas.microsoft.com/office/drawing/2014/main" val="20001"/>
                     </a:ext>
                   </a:extLst>
                 </a:gridCol>
-                <a:gridCol w="7540611">
+                <a:gridCol w="7570918">
                   <a:extLst>
                     <a:ext uri="{9D8B030D-6E8A-4147-A177-3AD203B41FA5}">
                       <a16:colId xmlns:a16="http://schemas.microsoft.com/office/drawing/2014/main" val="20002"/>
@@ -17386,7 +17386,7 @@
                   </a:extLst>
                 </a:gridCol>
               </a:tblGrid>
-              <a:tr h="637525">
+              <a:tr h="475847">
                 <a:tc>
                   <a:txBody>
                     <a:bodyPr/>
@@ -17478,7 +17478,7 @@
                   </a:ext>
                 </a:extLst>
               </a:tr>
-              <a:tr h="637525">
+              <a:tr h="475847">
                 <a:tc>
                   <a:txBody>
                     <a:bodyPr/>
@@ -17546,7 +17546,7 @@
                   </a:ext>
                 </a:extLst>
               </a:tr>
-              <a:tr h="637525">
+              <a:tr h="475847">
                 <a:tc>
                   <a:txBody>
                     <a:bodyPr/>
@@ -17638,7 +17638,7 @@
                   </a:ext>
                 </a:extLst>
               </a:tr>
-              <a:tr h="724229">
+              <a:tr h="655734">
                 <a:tc>
                   <a:txBody>
                     <a:bodyPr/>
@@ -17710,7 +17710,7 @@
                   </a:ext>
                 </a:extLst>
               </a:tr>
-              <a:tr h="724229">
+              <a:tr h="655734">
                 <a:tc>
                   <a:txBody>
                     <a:bodyPr/>
@@ -17774,7 +17774,7 @@
                   </a:ext>
                 </a:extLst>
               </a:tr>
-              <a:tr h="637525">
+              <a:tr h="475847">
                 <a:tc>
                   <a:txBody>
                     <a:bodyPr/>
@@ -17882,7 +17882,7 @@
                   </a:ext>
                 </a:extLst>
               </a:tr>
-              <a:tr h="637525">
+              <a:tr h="475847">
                 <a:tc>
                   <a:txBody>
                     <a:bodyPr/>
@@ -17950,7 +17950,7 @@
                   </a:ext>
                 </a:extLst>
               </a:tr>
-              <a:tr h="724229">
+              <a:tr h="655734">
                 <a:tc>
                   <a:txBody>
                     <a:bodyPr/>
@@ -18098,7 +18098,7 @@
                   </a:ext>
                 </a:extLst>
               </a:tr>
-              <a:tr h="724229">
+              <a:tr h="655734">
                 <a:tc>
                   <a:txBody>
                     <a:bodyPr/>
@@ -18126,7 +18126,7 @@
                       <a:pPr algn="ctr"/>
                       <a:r>
                         <a:rPr lang="ko-KR" altLang="en-US" dirty="0" smtClean="0"/>
-                        <a:t>밸런스 조절 및 추가 기능 구현</a:t>
+                        <a:t>리소스 추가 수집 및 추가 기능 구현</a:t>
                       </a:r>
                       <a:endParaRPr lang="ko-KR" altLang="en-US" dirty="0"/>
                     </a:p>
@@ -18140,8 +18140,12 @@
                     <a:p>
                       <a:pPr algn="ctr"/>
                       <a:r>
+                        <a:rPr lang="ko-KR" altLang="en-US" sz="1200" smtClean="0"/>
+                        <a:t>추가기능을 구현하고 게임을 </a:t>
+                      </a:r>
+                      <a:r>
                         <a:rPr lang="ko-KR" altLang="en-US" sz="1200" dirty="0" smtClean="0"/>
-                        <a:t>게임의 전체적인 밸런스를 조절하고 시간이 남으면 추가기능을 구현한다</a:t>
+                        <a:t>제작할 때 부족했던 리소스를 추가 수집해 적용한다</a:t>
                       </a:r>
                       <a:r>
                         <a:rPr lang="en-US" altLang="ko-KR" sz="1200" dirty="0" smtClean="0"/>
@@ -18155,6 +18159,146 @@
                 <a:extLst>
                   <a:ext uri="{0D108BD9-81ED-4DB2-BD59-A6C34878D82A}">
                     <a16:rowId xmlns:a16="http://schemas.microsoft.com/office/drawing/2014/main" val="10008"/>
+                  </a:ext>
+                </a:extLst>
+              </a:tr>
+              <a:tr h="655734">
+                <a:tc>
+                  <a:txBody>
+                    <a:bodyPr/>
+                    <a:lstStyle/>
+                    <a:p>
+                      <a:pPr algn="ctr"/>
+                      <a:r>
+                        <a:rPr lang="en-US" altLang="ko-KR" dirty="0" smtClean="0"/>
+                        <a:t>10</a:t>
+                      </a:r>
+                      <a:r>
+                        <a:rPr lang="ko-KR" altLang="en-US" dirty="0" smtClean="0"/>
+                        <a:t>주차</a:t>
+                      </a:r>
+                      <a:endParaRPr lang="ko-KR" altLang="en-US" dirty="0"/>
+                    </a:p>
+                  </a:txBody>
+                  <a:tcPr anchor="ctr"/>
+                </a:tc>
+                <a:tc>
+                  <a:txBody>
+                    <a:bodyPr/>
+                    <a:lstStyle/>
+                    <a:p>
+                      <a:pPr algn="ctr"/>
+                      <a:r>
+                        <a:rPr lang="ko-KR" altLang="en-US" dirty="0" smtClean="0"/>
+                        <a:t>밸런스 조절과 피드백 </a:t>
+                      </a:r>
+                      <a:r>
+                        <a:rPr lang="ko-KR" altLang="en-US" dirty="0" smtClean="0"/>
+                        <a:t>및 수정</a:t>
+                      </a:r>
+                      <a:endParaRPr lang="ko-KR" altLang="en-US" dirty="0"/>
+                    </a:p>
+                  </a:txBody>
+                  <a:tcPr anchor="ctr"/>
+                </a:tc>
+                <a:tc>
+                  <a:txBody>
+                    <a:bodyPr/>
+                    <a:lstStyle/>
+                    <a:p>
+                      <a:pPr algn="ctr"/>
+                      <a:r>
+                        <a:rPr lang="ko-KR" altLang="en-US" sz="1200" dirty="0" smtClean="0"/>
+                        <a:t>게임의 전체적인 밸런스를 조절하고 주변 </a:t>
+                      </a:r>
+                      <a:r>
+                        <a:rPr lang="ko-KR" altLang="en-US" sz="1200" dirty="0" smtClean="0"/>
+                        <a:t>사람들에게 피드백을 </a:t>
+                      </a:r>
+                      <a:r>
+                        <a:rPr lang="ko-KR" altLang="en-US" sz="1200" dirty="0" smtClean="0"/>
+                        <a:t>받아 </a:t>
+                      </a:r>
+                      <a:r>
+                        <a:rPr lang="ko-KR" altLang="en-US" sz="1200" dirty="0" smtClean="0"/>
+                        <a:t>수정한다</a:t>
+                      </a:r>
+                      <a:r>
+                        <a:rPr lang="en-US" altLang="ko-KR" sz="1200" dirty="0" smtClean="0"/>
+                        <a:t>.</a:t>
+                      </a:r>
+                      <a:endParaRPr lang="ko-KR" altLang="en-US" sz="1200" dirty="0"/>
+                    </a:p>
+                  </a:txBody>
+                  <a:tcPr anchor="ctr"/>
+                </a:tc>
+                <a:extLst>
+                  <a:ext uri="{0D108BD9-81ED-4DB2-BD59-A6C34878D82A}">
+                    <a16:rowId xmlns:a16="http://schemas.microsoft.com/office/drawing/2014/main" val="2379786054"/>
+                  </a:ext>
+                </a:extLst>
+              </a:tr>
+              <a:tr h="374705">
+                <a:tc>
+                  <a:txBody>
+                    <a:bodyPr/>
+                    <a:lstStyle/>
+                    <a:p>
+                      <a:pPr algn="ctr"/>
+                      <a:r>
+                        <a:rPr lang="en-US" altLang="ko-KR" dirty="0" smtClean="0"/>
+                        <a:t>11</a:t>
+                      </a:r>
+                      <a:r>
+                        <a:rPr lang="ko-KR" altLang="en-US" dirty="0" smtClean="0"/>
+                        <a:t>주차</a:t>
+                      </a:r>
+                      <a:endParaRPr lang="ko-KR" altLang="en-US" dirty="0"/>
+                    </a:p>
+                  </a:txBody>
+                  <a:tcPr anchor="ctr"/>
+                </a:tc>
+                <a:tc>
+                  <a:txBody>
+                    <a:bodyPr/>
+                    <a:lstStyle/>
+                    <a:p>
+                      <a:pPr algn="ctr"/>
+                      <a:r>
+                        <a:rPr lang="ko-KR" altLang="en-US" dirty="0" smtClean="0"/>
+                        <a:t>마무리</a:t>
+                      </a:r>
+                      <a:endParaRPr lang="ko-KR" altLang="en-US" dirty="0"/>
+                    </a:p>
+                  </a:txBody>
+                  <a:tcPr anchor="ctr"/>
+                </a:tc>
+                <a:tc>
+                  <a:txBody>
+                    <a:bodyPr/>
+                    <a:lstStyle/>
+                    <a:p>
+                      <a:pPr algn="ctr"/>
+                      <a:r>
+                        <a:rPr lang="ko-KR" altLang="en-US" sz="1200" dirty="0" err="1" smtClean="0"/>
+                        <a:t>릴리즈</a:t>
+                      </a:r>
+                      <a:r>
+                        <a:rPr lang="ko-KR" altLang="en-US" sz="1200" dirty="0" smtClean="0"/>
+                        <a:t> 파일 제작 및 마무리를 한다</a:t>
+                      </a:r>
+                      <a:r>
+                        <a:rPr lang="en-US" altLang="ko-KR" sz="1200" dirty="0" smtClean="0"/>
+                        <a:t>.</a:t>
+                      </a:r>
+                      <a:endParaRPr lang="ko-KR" altLang="en-US" sz="1200" dirty="0"/>
+                    </a:p>
+                  </a:txBody>
+                  <a:tcPr anchor="ctr"/>
+                </a:tc>
+                <a:extLst>
+                  <a:ext uri="{0D108BD9-81ED-4DB2-BD59-A6C34878D82A}">
+                    <a16:rowId xmlns:a16="http://schemas.microsoft.com/office/drawing/2014/main" val="1055360876"/>
                   </a:ext>
                 </a:extLst>
               </a:tr>

</xml_diff>